<commit_message>
fix: Readme pdated and FYP file
</commit_message>
<xml_diff>
--- a/FYP AI Based Ideas Zahoor - Abdullah.pptx
+++ b/FYP AI Based Ideas Zahoor - Abdullah.pptx
@@ -820,12 +820,12 @@
   </p:clrMapOvr>
   <mc:AlternateContent xmlns:mc="http://schemas.openxmlformats.org/markup-compatibility/2006">
     <mc:Choice xmlns:p159="http://schemas.microsoft.com/office/powerpoint/2015/09/main" Requires="p159">
-      <p:transition xmlns:p14="http://schemas.microsoft.com/office/powerpoint/2010/main" spd="slow" p14:dur="2000">
+      <p:transition spd="med">
         <p159:morph option="byObject"/>
       </p:transition>
     </mc:Choice>
     <mc:Fallback>
-      <p:transition spd="slow">
+      <p:transition spd="med">
         <p:fade/>
       </p:transition>
     </mc:Fallback>
@@ -1000,12 +1000,12 @@
   </p:clrMapOvr>
   <mc:AlternateContent xmlns:mc="http://schemas.openxmlformats.org/markup-compatibility/2006">
     <mc:Choice xmlns:p159="http://schemas.microsoft.com/office/powerpoint/2015/09/main" Requires="p159">
-      <p:transition xmlns:p14="http://schemas.microsoft.com/office/powerpoint/2010/main" spd="slow" p14:dur="2000">
+      <p:transition spd="med">
         <p159:morph option="byObject"/>
       </p:transition>
     </mc:Choice>
     <mc:Fallback>
-      <p:transition spd="slow">
+      <p:transition spd="med">
         <p:fade/>
       </p:transition>
     </mc:Fallback>
@@ -1190,12 +1190,12 @@
   </p:clrMapOvr>
   <mc:AlternateContent xmlns:mc="http://schemas.openxmlformats.org/markup-compatibility/2006">
     <mc:Choice xmlns:p159="http://schemas.microsoft.com/office/powerpoint/2015/09/main" Requires="p159">
-      <p:transition xmlns:p14="http://schemas.microsoft.com/office/powerpoint/2010/main" spd="slow" p14:dur="2000">
+      <p:transition spd="med">
         <p159:morph option="byObject"/>
       </p:transition>
     </mc:Choice>
     <mc:Fallback>
-      <p:transition spd="slow">
+      <p:transition spd="med">
         <p:fade/>
       </p:transition>
     </mc:Fallback>
@@ -1370,12 +1370,12 @@
   </p:clrMapOvr>
   <mc:AlternateContent xmlns:mc="http://schemas.openxmlformats.org/markup-compatibility/2006">
     <mc:Choice xmlns:p159="http://schemas.microsoft.com/office/powerpoint/2015/09/main" Requires="p159">
-      <p:transition xmlns:p14="http://schemas.microsoft.com/office/powerpoint/2010/main" spd="slow" p14:dur="2000">
+      <p:transition spd="med">
         <p159:morph option="byObject"/>
       </p:transition>
     </mc:Choice>
     <mc:Fallback>
-      <p:transition spd="slow">
+      <p:transition spd="med">
         <p:fade/>
       </p:transition>
     </mc:Fallback>
@@ -1627,12 +1627,12 @@
   </p:clrMapOvr>
   <mc:AlternateContent xmlns:mc="http://schemas.openxmlformats.org/markup-compatibility/2006">
     <mc:Choice xmlns:p159="http://schemas.microsoft.com/office/powerpoint/2015/09/main" Requires="p159">
-      <p:transition xmlns:p14="http://schemas.microsoft.com/office/powerpoint/2010/main" spd="slow" p14:dur="2000">
+      <p:transition spd="med">
         <p159:morph option="byObject"/>
       </p:transition>
     </mc:Choice>
     <mc:Fallback>
-      <p:transition spd="slow">
+      <p:transition spd="med">
         <p:fade/>
       </p:transition>
     </mc:Fallback>
@@ -1924,12 +1924,12 @@
   </p:clrMapOvr>
   <mc:AlternateContent xmlns:mc="http://schemas.openxmlformats.org/markup-compatibility/2006">
     <mc:Choice xmlns:p159="http://schemas.microsoft.com/office/powerpoint/2015/09/main" Requires="p159">
-      <p:transition xmlns:p14="http://schemas.microsoft.com/office/powerpoint/2010/main" spd="slow" p14:dur="2000">
+      <p:transition spd="med">
         <p159:morph option="byObject"/>
       </p:transition>
     </mc:Choice>
     <mc:Fallback>
-      <p:transition spd="slow">
+      <p:transition spd="med">
         <p:fade/>
       </p:transition>
     </mc:Fallback>
@@ -2355,12 +2355,12 @@
   </p:clrMapOvr>
   <mc:AlternateContent xmlns:mc="http://schemas.openxmlformats.org/markup-compatibility/2006">
     <mc:Choice xmlns:p159="http://schemas.microsoft.com/office/powerpoint/2015/09/main" Requires="p159">
-      <p:transition xmlns:p14="http://schemas.microsoft.com/office/powerpoint/2010/main" spd="slow" p14:dur="2000">
+      <p:transition spd="med">
         <p159:morph option="byObject"/>
       </p:transition>
     </mc:Choice>
     <mc:Fallback>
-      <p:transition spd="slow">
+      <p:transition spd="med">
         <p:fade/>
       </p:transition>
     </mc:Fallback>
@@ -2484,12 +2484,12 @@
   </p:clrMapOvr>
   <mc:AlternateContent xmlns:mc="http://schemas.openxmlformats.org/markup-compatibility/2006">
     <mc:Choice xmlns:p159="http://schemas.microsoft.com/office/powerpoint/2015/09/main" Requires="p159">
-      <p:transition xmlns:p14="http://schemas.microsoft.com/office/powerpoint/2010/main" spd="slow" p14:dur="2000">
+      <p:transition spd="med">
         <p159:morph option="byObject"/>
       </p:transition>
     </mc:Choice>
     <mc:Fallback>
-      <p:transition spd="slow">
+      <p:transition spd="med">
         <p:fade/>
       </p:transition>
     </mc:Fallback>
@@ -2591,12 +2591,12 @@
   </p:clrMapOvr>
   <mc:AlternateContent xmlns:mc="http://schemas.openxmlformats.org/markup-compatibility/2006">
     <mc:Choice xmlns:p159="http://schemas.microsoft.com/office/powerpoint/2015/09/main" Requires="p159">
-      <p:transition xmlns:p14="http://schemas.microsoft.com/office/powerpoint/2010/main" spd="slow" p14:dur="2000">
+      <p:transition spd="med">
         <p159:morph option="byObject"/>
       </p:transition>
     </mc:Choice>
     <mc:Fallback>
-      <p:transition spd="slow">
+      <p:transition spd="med">
         <p:fade/>
       </p:transition>
     </mc:Fallback>
@@ -2878,12 +2878,12 @@
   </p:clrMapOvr>
   <mc:AlternateContent xmlns:mc="http://schemas.openxmlformats.org/markup-compatibility/2006">
     <mc:Choice xmlns:p159="http://schemas.microsoft.com/office/powerpoint/2015/09/main" Requires="p159">
-      <p:transition xmlns:p14="http://schemas.microsoft.com/office/powerpoint/2010/main" spd="slow" p14:dur="2000">
+      <p:transition spd="med">
         <p159:morph option="byObject"/>
       </p:transition>
     </mc:Choice>
     <mc:Fallback>
-      <p:transition spd="slow">
+      <p:transition spd="med">
         <p:fade/>
       </p:transition>
     </mc:Fallback>
@@ -3142,12 +3142,12 @@
   </p:clrMapOvr>
   <mc:AlternateContent xmlns:mc="http://schemas.openxmlformats.org/markup-compatibility/2006">
     <mc:Choice xmlns:p159="http://schemas.microsoft.com/office/powerpoint/2015/09/main" Requires="p159">
-      <p:transition xmlns:p14="http://schemas.microsoft.com/office/powerpoint/2010/main" spd="slow" p14:dur="2000">
+      <p:transition spd="med">
         <p159:morph option="byObject"/>
       </p:transition>
     </mc:Choice>
     <mc:Fallback>
-      <p:transition spd="slow">
+      <p:transition spd="med">
         <p:fade/>
       </p:transition>
     </mc:Fallback>
@@ -3444,12 +3444,12 @@
   </p:sldLayoutIdLst>
   <mc:AlternateContent xmlns:mc="http://schemas.openxmlformats.org/markup-compatibility/2006">
     <mc:Choice xmlns:p159="http://schemas.microsoft.com/office/powerpoint/2015/09/main" Requires="p159">
-      <p:transition xmlns:p14="http://schemas.microsoft.com/office/powerpoint/2010/main" spd="slow" p14:dur="2000">
+      <p:transition spd="med">
         <p159:morph option="byObject"/>
       </p:transition>
     </mc:Choice>
     <mc:Fallback>
-      <p:transition spd="slow">
+      <p:transition spd="med">
         <p:fade/>
       </p:transition>
     </mc:Fallback>
@@ -3986,12 +3986,12 @@
   </p:clrMapOvr>
   <mc:AlternateContent xmlns:mc="http://schemas.openxmlformats.org/markup-compatibility/2006">
     <mc:Choice xmlns:p159="http://schemas.microsoft.com/office/powerpoint/2015/09/main" Requires="p159">
-      <p:transition xmlns:p14="http://schemas.microsoft.com/office/powerpoint/2010/main" spd="slow" p14:dur="2000">
+      <p:transition spd="med">
         <p159:morph option="byObject"/>
       </p:transition>
     </mc:Choice>
     <mc:Fallback>
-      <p:transition spd="slow">
+      <p:transition spd="med">
         <p:fade/>
       </p:transition>
     </mc:Fallback>
@@ -4347,12 +4347,12 @@
   </p:clrMapOvr>
   <mc:AlternateContent xmlns:mc="http://schemas.openxmlformats.org/markup-compatibility/2006">
     <mc:Choice xmlns:p159="http://schemas.microsoft.com/office/powerpoint/2015/09/main" Requires="p159">
-      <p:transition xmlns:p14="http://schemas.microsoft.com/office/powerpoint/2010/main" spd="slow" p14:dur="2000">
+      <p:transition spd="med">
         <p159:morph option="byObject"/>
       </p:transition>
     </mc:Choice>
     <mc:Fallback>
-      <p:transition spd="slow">
+      <p:transition spd="med">
         <p:fade/>
       </p:transition>
     </mc:Fallback>
@@ -4451,7 +4451,7 @@
                 <a:latin typeface="Times New Roman" panose="02020603050405020304" pitchFamily="18" charset="0"/>
                 <a:cs typeface="Times New Roman" panose="02020603050405020304" pitchFamily="18" charset="0"/>
               </a:rPr>
-              <a:t>MongoDB, Prisma: Data management for storing user posts and interactions.</a:t>
+              <a:t>DB, Prisma: Data management for storing user posts and interactions.</a:t>
             </a:r>
           </a:p>
         </p:txBody>
@@ -4682,12 +4682,12 @@
   </p:clrMapOvr>
   <mc:AlternateContent xmlns:mc="http://schemas.openxmlformats.org/markup-compatibility/2006">
     <mc:Choice xmlns:p159="http://schemas.microsoft.com/office/powerpoint/2015/09/main" Requires="p159">
-      <p:transition xmlns:p14="http://schemas.microsoft.com/office/powerpoint/2010/main" spd="slow" p14:dur="2000">
+      <p:transition spd="med">
         <p159:morph option="byObject"/>
       </p:transition>
     </mc:Choice>
     <mc:Fallback>
-      <p:transition spd="slow">
+      <p:transition spd="med">
         <p:fade/>
       </p:transition>
     </mc:Fallback>
@@ -5001,12 +5001,12 @@
   </p:clrMapOvr>
   <mc:AlternateContent xmlns:mc="http://schemas.openxmlformats.org/markup-compatibility/2006">
     <mc:Choice xmlns:p159="http://schemas.microsoft.com/office/powerpoint/2015/09/main" Requires="p159">
-      <p:transition xmlns:p14="http://schemas.microsoft.com/office/powerpoint/2010/main" spd="slow" p14:dur="2000">
+      <p:transition spd="med">
         <p159:morph option="byObject"/>
       </p:transition>
     </mc:Choice>
     <mc:Fallback>
-      <p:transition spd="slow">
+      <p:transition spd="med">
         <p:fade/>
       </p:transition>
     </mc:Fallback>
@@ -5412,12 +5412,12 @@
   </p:clrMapOvr>
   <mc:AlternateContent xmlns:mc="http://schemas.openxmlformats.org/markup-compatibility/2006">
     <mc:Choice xmlns:p159="http://schemas.microsoft.com/office/powerpoint/2015/09/main" Requires="p159">
-      <p:transition xmlns:p14="http://schemas.microsoft.com/office/powerpoint/2010/main" spd="slow" p14:dur="2000">
+      <p:transition spd="med">
         <p159:morph option="byObject"/>
       </p:transition>
     </mc:Choice>
     <mc:Fallback>
-      <p:transition spd="slow">
+      <p:transition spd="med">
         <p:fade/>
       </p:transition>
     </mc:Fallback>
@@ -5730,14 +5730,14 @@
   <p:clrMapOvr>
     <a:masterClrMapping/>
   </p:clrMapOvr>
-  <mc:AlternateContent xmlns:mc="http://schemas.openxmlformats.org/markup-compatibility/2006" xmlns:p159="http://schemas.microsoft.com/office/powerpoint/2015/09/main">
-    <mc:Choice Requires="p159">
-      <p:transition xmlns:p14="http://schemas.microsoft.com/office/powerpoint/2010/main" spd="slow" p14:dur="2000">
+  <mc:AlternateContent xmlns:mc="http://schemas.openxmlformats.org/markup-compatibility/2006">
+    <mc:Choice xmlns:p159="http://schemas.microsoft.com/office/powerpoint/2015/09/main" Requires="p159">
+      <p:transition spd="med">
         <p159:morph option="byObject"/>
       </p:transition>
     </mc:Choice>
-    <mc:Fallback xmlns="">
-      <p:transition spd="slow">
+    <mc:Fallback>
+      <p:transition spd="med">
         <p:fade/>
       </p:transition>
     </mc:Fallback>
@@ -6063,14 +6063,14 @@
   <p:clrMapOvr>
     <a:masterClrMapping/>
   </p:clrMapOvr>
-  <mc:AlternateContent xmlns:mc="http://schemas.openxmlformats.org/markup-compatibility/2006" xmlns:p159="http://schemas.microsoft.com/office/powerpoint/2015/09/main">
-    <mc:Choice Requires="p159">
-      <p:transition xmlns:p14="http://schemas.microsoft.com/office/powerpoint/2010/main" spd="slow" p14:dur="2000">
+  <mc:AlternateContent xmlns:mc="http://schemas.openxmlformats.org/markup-compatibility/2006">
+    <mc:Choice xmlns:p159="http://schemas.microsoft.com/office/powerpoint/2015/09/main" Requires="p159">
+      <p:transition spd="med">
         <p159:morph option="byObject"/>
       </p:transition>
     </mc:Choice>
-    <mc:Fallback xmlns="">
-      <p:transition spd="slow">
+    <mc:Fallback>
+      <p:transition spd="med">
         <p:fade/>
       </p:transition>
     </mc:Fallback>
@@ -6393,14 +6393,14 @@
   <p:clrMapOvr>
     <a:masterClrMapping/>
   </p:clrMapOvr>
-  <mc:AlternateContent xmlns:mc="http://schemas.openxmlformats.org/markup-compatibility/2006" xmlns:p159="http://schemas.microsoft.com/office/powerpoint/2015/09/main">
-    <mc:Choice Requires="p159">
-      <p:transition xmlns:p14="http://schemas.microsoft.com/office/powerpoint/2010/main" spd="slow" p14:dur="2000">
+  <mc:AlternateContent xmlns:mc="http://schemas.openxmlformats.org/markup-compatibility/2006">
+    <mc:Choice xmlns:p159="http://schemas.microsoft.com/office/powerpoint/2015/09/main" Requires="p159">
+      <p:transition spd="med">
         <p159:morph option="byObject"/>
       </p:transition>
     </mc:Choice>
-    <mc:Fallback xmlns="">
-      <p:transition spd="slow">
+    <mc:Fallback>
+      <p:transition spd="med">
         <p:fade/>
       </p:transition>
     </mc:Fallback>
@@ -6731,14 +6731,14 @@
   <p:clrMapOvr>
     <a:masterClrMapping/>
   </p:clrMapOvr>
-  <mc:AlternateContent xmlns:mc="http://schemas.openxmlformats.org/markup-compatibility/2006" xmlns:p159="http://schemas.microsoft.com/office/powerpoint/2015/09/main">
-    <mc:Choice Requires="p159">
-      <p:transition xmlns:p14="http://schemas.microsoft.com/office/powerpoint/2010/main" spd="slow" p14:dur="2000">
+  <mc:AlternateContent xmlns:mc="http://schemas.openxmlformats.org/markup-compatibility/2006">
+    <mc:Choice xmlns:p159="http://schemas.microsoft.com/office/powerpoint/2015/09/main" Requires="p159">
+      <p:transition spd="med">
         <p159:morph option="byObject"/>
       </p:transition>
     </mc:Choice>
-    <mc:Fallback xmlns="">
-      <p:transition spd="slow">
+    <mc:Fallback>
+      <p:transition spd="med">
         <p:fade/>
       </p:transition>
     </mc:Fallback>
@@ -6840,31 +6840,6 @@
             </a:pPr>
             <a:r>
               <a:rPr dirty="0"/>
-              <a:t>- Data: Python (</a:t>
-            </a:r>
-            <a:r>
-              <a:rPr dirty="0" err="1"/>
-              <a:t>Scrapy</a:t>
-            </a:r>
-            <a:r>
-              <a:rPr dirty="0"/>
-              <a:t>, </a:t>
-            </a:r>
-            <a:r>
-              <a:rPr dirty="0" err="1"/>
-              <a:t>BeautifulSoup</a:t>
-            </a:r>
-            <a:r>
-              <a:rPr dirty="0"/>
-              <a:t>).</a:t>
-            </a:r>
-          </a:p>
-          <a:p>
-            <a:pPr marL="0" indent="0">
-              <a:buNone/>
-            </a:pPr>
-            <a:r>
-              <a:rPr dirty="0"/>
               <a:t>- Optional: 3D Rendering with Three.js (Based on data availability).</a:t>
             </a:r>
           </a:p>
@@ -7094,14 +7069,14 @@
   <p:clrMapOvr>
     <a:masterClrMapping/>
   </p:clrMapOvr>
-  <mc:AlternateContent xmlns:mc="http://schemas.openxmlformats.org/markup-compatibility/2006" xmlns:p159="http://schemas.microsoft.com/office/powerpoint/2015/09/main">
-    <mc:Choice Requires="p159">
-      <p:transition xmlns:p14="http://schemas.microsoft.com/office/powerpoint/2010/main" spd="slow" p14:dur="2000">
+  <mc:AlternateContent xmlns:mc="http://schemas.openxmlformats.org/markup-compatibility/2006">
+    <mc:Choice xmlns:p159="http://schemas.microsoft.com/office/powerpoint/2015/09/main" Requires="p159">
+      <p:transition spd="med">
         <p159:morph option="byObject"/>
       </p:transition>
     </mc:Choice>
-    <mc:Fallback xmlns="">
-      <p:transition spd="slow">
+    <mc:Fallback>
+      <p:transition spd="med">
         <p:fade/>
       </p:transition>
     </mc:Fallback>
@@ -7458,14 +7433,14 @@
   <p:clrMapOvr>
     <a:masterClrMapping/>
   </p:clrMapOvr>
-  <mc:AlternateContent xmlns:mc="http://schemas.openxmlformats.org/markup-compatibility/2006" xmlns:p159="http://schemas.microsoft.com/office/powerpoint/2015/09/main">
-    <mc:Choice Requires="p159">
-      <p:transition xmlns:p14="http://schemas.microsoft.com/office/powerpoint/2010/main" spd="slow" p14:dur="2000">
+  <mc:AlternateContent xmlns:mc="http://schemas.openxmlformats.org/markup-compatibility/2006">
+    <mc:Choice xmlns:p159="http://schemas.microsoft.com/office/powerpoint/2015/09/main" Requires="p159">
+      <p:transition spd="med">
         <p159:morph option="byObject"/>
       </p:transition>
     </mc:Choice>
-    <mc:Fallback xmlns="">
-      <p:transition spd="slow">
+    <mc:Fallback>
+      <p:transition spd="med">
         <p:fade/>
       </p:transition>
     </mc:Fallback>
@@ -7871,12 +7846,12 @@
   </p:clrMapOvr>
   <mc:AlternateContent xmlns:mc="http://schemas.openxmlformats.org/markup-compatibility/2006">
     <mc:Choice xmlns:p159="http://schemas.microsoft.com/office/powerpoint/2015/09/main" Requires="p159">
-      <p:transition xmlns:p14="http://schemas.microsoft.com/office/powerpoint/2010/main" spd="slow" p14:dur="2000">
+      <p:transition spd="med">
         <p159:morph option="byObject"/>
       </p:transition>
     </mc:Choice>
     <mc:Fallback>
-      <p:transition spd="slow">
+      <p:transition spd="med">
         <p:fade/>
       </p:transition>
     </mc:Fallback>
@@ -8207,14 +8182,14 @@
   <p:clrMapOvr>
     <a:masterClrMapping/>
   </p:clrMapOvr>
-  <mc:AlternateContent xmlns:mc="http://schemas.openxmlformats.org/markup-compatibility/2006" xmlns:p159="http://schemas.microsoft.com/office/powerpoint/2015/09/main">
-    <mc:Choice Requires="p159">
-      <p:transition xmlns:p14="http://schemas.microsoft.com/office/powerpoint/2010/main" spd="slow" p14:dur="2000">
+  <mc:AlternateContent xmlns:mc="http://schemas.openxmlformats.org/markup-compatibility/2006">
+    <mc:Choice xmlns:p159="http://schemas.microsoft.com/office/powerpoint/2015/09/main" Requires="p159">
+      <p:transition spd="med">
         <p159:morph option="byObject"/>
       </p:transition>
     </mc:Choice>
-    <mc:Fallback xmlns="">
-      <p:transition spd="slow">
+    <mc:Fallback>
+      <p:transition spd="med">
         <p:fade/>
       </p:transition>
     </mc:Fallback>
@@ -8223,7 +8198,7 @@
 </file>
 
 <file path=ppt/slides/slide21.xml><?xml version="1.0" encoding="utf-8"?>
-<p:sld xmlns:a="http://schemas.openxmlformats.org/drawingml/2006/main" xmlns:r="http://schemas.openxmlformats.org/officeDocument/2006/relationships" xmlns:p="http://schemas.openxmlformats.org/presentationml/2006/main">
+<p:sld xmlns:a="http://schemas.openxmlformats.org/drawingml/2006/main" xmlns:r="http://schemas.openxmlformats.org/officeDocument/2006/relationships" xmlns:p="http://schemas.openxmlformats.org/presentationml/2006/main" show="0">
   <p:cSld>
     <p:spTree>
       <p:nvGrpSpPr>
@@ -8545,14 +8520,14 @@
   <p:clrMapOvr>
     <a:masterClrMapping/>
   </p:clrMapOvr>
-  <mc:AlternateContent xmlns:mc="http://schemas.openxmlformats.org/markup-compatibility/2006" xmlns:p159="http://schemas.microsoft.com/office/powerpoint/2015/09/main">
-    <mc:Choice Requires="p159">
-      <p:transition xmlns:p14="http://schemas.microsoft.com/office/powerpoint/2010/main" spd="slow" p14:dur="2000">
+  <mc:AlternateContent xmlns:mc="http://schemas.openxmlformats.org/markup-compatibility/2006">
+    <mc:Choice xmlns:p159="http://schemas.microsoft.com/office/powerpoint/2015/09/main" Requires="p159">
+      <p:transition spd="med">
         <p159:morph option="byObject"/>
       </p:transition>
     </mc:Choice>
-    <mc:Fallback xmlns="">
-      <p:transition spd="slow">
+    <mc:Fallback>
+      <p:transition spd="med">
         <p:fade/>
       </p:transition>
     </mc:Fallback>
@@ -8561,7 +8536,7 @@
 </file>
 
 <file path=ppt/slides/slide22.xml><?xml version="1.0" encoding="utf-8"?>
-<p:sld xmlns:a="http://schemas.openxmlformats.org/drawingml/2006/main" xmlns:r="http://schemas.openxmlformats.org/officeDocument/2006/relationships" xmlns:p="http://schemas.openxmlformats.org/presentationml/2006/main">
+<p:sld xmlns:a="http://schemas.openxmlformats.org/drawingml/2006/main" xmlns:r="http://schemas.openxmlformats.org/officeDocument/2006/relationships" xmlns:p="http://schemas.openxmlformats.org/presentationml/2006/main" show="0">
   <p:cSld>
     <p:spTree>
       <p:nvGrpSpPr>
@@ -8883,14 +8858,14 @@
   <p:clrMapOvr>
     <a:masterClrMapping/>
   </p:clrMapOvr>
-  <mc:AlternateContent xmlns:mc="http://schemas.openxmlformats.org/markup-compatibility/2006" xmlns:p159="http://schemas.microsoft.com/office/powerpoint/2015/09/main">
-    <mc:Choice Requires="p159">
-      <p:transition xmlns:p14="http://schemas.microsoft.com/office/powerpoint/2010/main" spd="slow" p14:dur="2000">
+  <mc:AlternateContent xmlns:mc="http://schemas.openxmlformats.org/markup-compatibility/2006">
+    <mc:Choice xmlns:p159="http://schemas.microsoft.com/office/powerpoint/2015/09/main" Requires="p159">
+      <p:transition spd="med">
         <p159:morph option="byObject"/>
       </p:transition>
     </mc:Choice>
-    <mc:Fallback xmlns="">
-      <p:transition spd="slow">
+    <mc:Fallback>
+      <p:transition spd="med">
         <p:fade/>
       </p:transition>
     </mc:Fallback>
@@ -9169,14 +9144,14 @@
   <p:clrMapOvr>
     <a:masterClrMapping/>
   </p:clrMapOvr>
-  <mc:AlternateContent xmlns:mc="http://schemas.openxmlformats.org/markup-compatibility/2006" xmlns:p159="http://schemas.microsoft.com/office/powerpoint/2015/09/main">
-    <mc:Choice Requires="p159">
-      <p:transition xmlns:p14="http://schemas.microsoft.com/office/powerpoint/2010/main" spd="slow" p14:dur="2000">
+  <mc:AlternateContent xmlns:mc="http://schemas.openxmlformats.org/markup-compatibility/2006">
+    <mc:Choice xmlns:p159="http://schemas.microsoft.com/office/powerpoint/2015/09/main" Requires="p159">
+      <p:transition spd="med">
         <p159:morph option="byObject"/>
       </p:transition>
     </mc:Choice>
-    <mc:Fallback xmlns="">
-      <p:transition spd="slow">
+    <mc:Fallback>
+      <p:transition spd="med">
         <p:fade/>
       </p:transition>
     </mc:Fallback>
@@ -9512,12 +9487,12 @@
   </p:clrMapOvr>
   <mc:AlternateContent xmlns:mc="http://schemas.openxmlformats.org/markup-compatibility/2006">
     <mc:Choice xmlns:p159="http://schemas.microsoft.com/office/powerpoint/2015/09/main" Requires="p159">
-      <p:transition xmlns:p14="http://schemas.microsoft.com/office/powerpoint/2010/main" spd="slow" p14:dur="2000">
+      <p:transition spd="med">
         <p159:morph option="byObject"/>
       </p:transition>
     </mc:Choice>
     <mc:Fallback>
-      <p:transition spd="slow">
+      <p:transition spd="med">
         <p:fade/>
       </p:transition>
     </mc:Fallback>
@@ -9856,12 +9831,12 @@
   </p:clrMapOvr>
   <mc:AlternateContent xmlns:mc="http://schemas.openxmlformats.org/markup-compatibility/2006">
     <mc:Choice xmlns:p159="http://schemas.microsoft.com/office/powerpoint/2015/09/main" Requires="p159">
-      <p:transition xmlns:p14="http://schemas.microsoft.com/office/powerpoint/2010/main" spd="slow" p14:dur="2000">
+      <p:transition spd="med">
         <p159:morph option="byObject"/>
       </p:transition>
     </mc:Choice>
     <mc:Fallback>
-      <p:transition spd="slow">
+      <p:transition spd="med">
         <p:fade/>
       </p:transition>
     </mc:Fallback>
@@ -10237,12 +10212,12 @@
   </p:clrMapOvr>
   <mc:AlternateContent xmlns:mc="http://schemas.openxmlformats.org/markup-compatibility/2006">
     <mc:Choice xmlns:p159="http://schemas.microsoft.com/office/powerpoint/2015/09/main" Requires="p159">
-      <p:transition xmlns:p14="http://schemas.microsoft.com/office/powerpoint/2010/main" spd="slow" p14:dur="2000">
+      <p:transition spd="med">
         <p159:morph option="byObject"/>
       </p:transition>
     </mc:Choice>
     <mc:Fallback>
-      <p:transition spd="slow">
+      <p:transition spd="med">
         <p:fade/>
       </p:transition>
     </mc:Fallback>
@@ -10251,7 +10226,7 @@
 </file>
 
 <file path=ppt/slides/slide6.xml><?xml version="1.0" encoding="utf-8"?>
-<p:sld xmlns:a="http://schemas.openxmlformats.org/drawingml/2006/main" xmlns:r="http://schemas.openxmlformats.org/officeDocument/2006/relationships" xmlns:p="http://schemas.openxmlformats.org/presentationml/2006/main">
+<p:sld xmlns:a="http://schemas.openxmlformats.org/drawingml/2006/main" xmlns:r="http://schemas.openxmlformats.org/officeDocument/2006/relationships" xmlns:p="http://schemas.openxmlformats.org/presentationml/2006/main" show="0">
   <p:cSld>
     <p:spTree>
       <p:nvGrpSpPr>
@@ -10364,12 +10339,12 @@
   </p:clrMapOvr>
   <mc:AlternateContent xmlns:mc="http://schemas.openxmlformats.org/markup-compatibility/2006">
     <mc:Choice xmlns:p159="http://schemas.microsoft.com/office/powerpoint/2015/09/main" Requires="p159">
-      <p:transition xmlns:p14="http://schemas.microsoft.com/office/powerpoint/2010/main" spd="slow" p14:dur="2000">
+      <p:transition spd="med">
         <p159:morph option="byObject"/>
       </p:transition>
     </mc:Choice>
     <mc:Fallback>
-      <p:transition spd="slow">
+      <p:transition spd="med">
         <p:fade/>
       </p:transition>
     </mc:Fallback>
@@ -10378,7 +10353,7 @@
 </file>
 
 <file path=ppt/slides/slide7.xml><?xml version="1.0" encoding="utf-8"?>
-<p:sld xmlns:a="http://schemas.openxmlformats.org/drawingml/2006/main" xmlns:r="http://schemas.openxmlformats.org/officeDocument/2006/relationships" xmlns:p="http://schemas.openxmlformats.org/presentationml/2006/main">
+<p:sld xmlns:a="http://schemas.openxmlformats.org/drawingml/2006/main" xmlns:r="http://schemas.openxmlformats.org/officeDocument/2006/relationships" xmlns:p="http://schemas.openxmlformats.org/presentationml/2006/main" show="0">
   <p:cSld>
     <p:spTree>
       <p:nvGrpSpPr>
@@ -10689,12 +10664,12 @@
   </p:clrMapOvr>
   <mc:AlternateContent xmlns:mc="http://schemas.openxmlformats.org/markup-compatibility/2006">
     <mc:Choice xmlns:p159="http://schemas.microsoft.com/office/powerpoint/2015/09/main" Requires="p159">
-      <p:transition xmlns:p14="http://schemas.microsoft.com/office/powerpoint/2010/main" spd="slow" p14:dur="2000">
+      <p:transition spd="med">
         <p159:morph option="byObject"/>
       </p:transition>
     </mc:Choice>
     <mc:Fallback>
-      <p:transition spd="slow">
+      <p:transition spd="med">
         <p:fade/>
       </p:transition>
     </mc:Fallback>
@@ -11034,12 +11009,12 @@
   </p:clrMapOvr>
   <mc:AlternateContent xmlns:mc="http://schemas.openxmlformats.org/markup-compatibility/2006">
     <mc:Choice xmlns:p159="http://schemas.microsoft.com/office/powerpoint/2015/09/main" Requires="p159">
-      <p:transition xmlns:p14="http://schemas.microsoft.com/office/powerpoint/2010/main" spd="slow" p14:dur="2000">
+      <p:transition spd="med">
         <p159:morph option="byObject"/>
       </p:transition>
     </mc:Choice>
     <mc:Fallback>
-      <p:transition spd="slow">
+      <p:transition spd="med">
         <p:fade/>
       </p:transition>
     </mc:Fallback>
@@ -11048,7 +11023,7 @@
 </file>
 
 <file path=ppt/slides/slide9.xml><?xml version="1.0" encoding="utf-8"?>
-<p:sld xmlns:a="http://schemas.openxmlformats.org/drawingml/2006/main" xmlns:r="http://schemas.openxmlformats.org/officeDocument/2006/relationships" xmlns:p="http://schemas.openxmlformats.org/presentationml/2006/main">
+<p:sld xmlns:a="http://schemas.openxmlformats.org/drawingml/2006/main" xmlns:r="http://schemas.openxmlformats.org/officeDocument/2006/relationships" xmlns:p="http://schemas.openxmlformats.org/presentationml/2006/main" show="0">
   <p:cSld>
     <p:spTree>
       <p:nvGrpSpPr>
@@ -11359,12 +11334,12 @@
   </p:clrMapOvr>
   <mc:AlternateContent xmlns:mc="http://schemas.openxmlformats.org/markup-compatibility/2006">
     <mc:Choice xmlns:p159="http://schemas.microsoft.com/office/powerpoint/2015/09/main" Requires="p159">
-      <p:transition xmlns:p14="http://schemas.microsoft.com/office/powerpoint/2010/main" spd="slow" p14:dur="2000">
+      <p:transition spd="med">
         <p159:morph option="byObject"/>
       </p:transition>
     </mc:Choice>
     <mc:Fallback>
-      <p:transition spd="slow">
+      <p:transition spd="med">
         <p:fade/>
       </p:transition>
     </mc:Fallback>

</xml_diff>